<commit_message>
edits to ISDP poster
</commit_message>
<xml_diff>
--- a/presentations/ISDP_absorptionposter.pptx
+++ b/presentations/ISDP_absorptionposter.pptx
@@ -262,7 +262,7 @@
       <p15:sldGuideLst xmlns:p15="http://schemas.microsoft.com/office/powerpoint/2012/main"/>
     </p:ext>
     <p:ext uri="http://customooxmlschemas.google.com/">
-      <go:slidesCustomData xmlns="" xmlns:mc="http://schemas.openxmlformats.org/markup-compatibility/2006" xmlns:mv="urn:schemas-microsoft-com:mac:vml" xmlns:c="http://schemas.openxmlformats.org/drawingml/2006/chart" xmlns:dgm="http://schemas.openxmlformats.org/drawingml/2006/diagram" xmlns:o="urn:schemas-microsoft-com:office:office" xmlns:v="urn:schemas-microsoft-com:vml" xmlns:pvml="urn:schemas-microsoft-com:office:powerpoint" xmlns:com="http://schemas.openxmlformats.org/drawingml/2006/compatibility" xmlns:p14="http://schemas.microsoft.com/office/powerpoint/2010/main" xmlns:p15="http://schemas.microsoft.com/office/powerpoint/2012/main" xmlns:ahyp="http://schemas.microsoft.com/office/drawing/2018/hyperlinkcolor" xmlns:go="http://customooxmlschemas.google.com/" r:id="rId12" roundtripDataSignature="AMtx7mgUZ/EanI988gELEzf8evnhnh3MyA=="/>
+      <go:slidesCustomData xmlns:go="http://customooxmlschemas.google.com/" xmlns:ahyp="http://schemas.microsoft.com/office/drawing/2018/hyperlinkcolor" xmlns:p15="http://schemas.microsoft.com/office/powerpoint/2012/main" xmlns:p14="http://schemas.microsoft.com/office/powerpoint/2010/main" xmlns:com="http://schemas.openxmlformats.org/drawingml/2006/compatibility" xmlns:pvml="urn:schemas-microsoft-com:office:powerpoint" xmlns:v="urn:schemas-microsoft-com:vml" xmlns:o="urn:schemas-microsoft-com:office:office" xmlns:dgm="http://schemas.openxmlformats.org/drawingml/2006/diagram" xmlns:c="http://schemas.openxmlformats.org/drawingml/2006/chart" xmlns:mv="urn:schemas-microsoft-com:mac:vml" xmlns:mc="http://schemas.openxmlformats.org/markup-compatibility/2006" xmlns="" r:id="rId12" roundtripDataSignature="AMtx7mgUZ/EanI988gELEzf8evnhnh3MyA=="/>
     </p:ext>
   </p:extLst>
 </p:presentation>
@@ -9872,24 +9872,6 @@
                 <a:cs typeface="Arial" panose="020B0604020202020204" pitchFamily="34" charset="0"/>
                 <a:sym typeface="Helvetica Neue"/>
               </a:rPr>
-              <a:t>Early life adversity is associated with more reported absorption in music cross all dimensions</a:t>
-            </a:r>
-          </a:p>
-          <a:p>
-            <a:pPr marL="457200" indent="-457200" fontAlgn="base">
-              <a:buFont typeface="Arial" panose="020B0604020202020204" pitchFamily="34" charset="0"/>
-              <a:buChar char="•"/>
-            </a:pPr>
-            <a:r>
-              <a:rPr lang="en-US" sz="3200" dirty="0">
-                <a:solidFill>
-                  <a:schemeClr val="dk1"/>
-                </a:solidFill>
-                <a:latin typeface="Arial" panose="020B0604020202020204" pitchFamily="34" charset="0"/>
-                <a:ea typeface="Helvetica Neue"/>
-                <a:cs typeface="Arial" panose="020B0604020202020204" pitchFamily="34" charset="0"/>
-                <a:sym typeface="Helvetica Neue"/>
-              </a:rPr>
               <a:t>Absorption positively correlated with resilience and healthy music usage, suggesting it can serve an adaptive purpose</a:t>
             </a:r>
           </a:p>
@@ -9908,7 +9890,7 @@
                 <a:cs typeface="Arial" panose="020B0604020202020204" pitchFamily="34" charset="0"/>
                 <a:sym typeface="Helvetica Neue"/>
               </a:rPr>
-              <a:t>Items on the unhealthy music usage scale index music listening as a form of escapism (e.g. “I hide in my music because nobody understands me, and it blocks people out),</a:t>
+              <a:t>Items on the unhealthy music usage scale index music listening as a form of escapism (e.g. “I hide in my music because nobody understands me, and it blocks people out)</a:t>
             </a:r>
           </a:p>
           <a:p>
@@ -10002,6 +9984,18 @@
             </a:endParaRPr>
           </a:p>
           <a:p>
+            <a:pPr fontAlgn="base"/>
+            <a:endParaRPr lang="en-US" sz="3200" dirty="0">
+              <a:solidFill>
+                <a:schemeClr val="dk1"/>
+              </a:solidFill>
+              <a:latin typeface="Arial" panose="020B0604020202020204" pitchFamily="34" charset="0"/>
+              <a:ea typeface="Helvetica Neue"/>
+              <a:cs typeface="Arial" panose="020B0604020202020204" pitchFamily="34" charset="0"/>
+              <a:sym typeface="Helvetica Neue"/>
+            </a:endParaRPr>
+          </a:p>
+          <a:p>
             <a:pPr marL="457200" indent="-457200" fontAlgn="base">
               <a:buFont typeface="Arial" panose="020B0604020202020204" pitchFamily="34" charset="0"/>
               <a:buChar char="•"/>
@@ -10016,7 +10010,7 @@
                 <a:cs typeface="Arial" panose="020B0604020202020204" pitchFamily="34" charset="0"/>
                 <a:sym typeface="Helvetica Neue"/>
               </a:rPr>
-              <a:t>288 participants (141F) recruited through Prolific from another previous experiment in our lab completed the study on Qualtrics</a:t>
+              <a:t>288 participants (141F) recruited through Prolific from another previous experiment </a:t>
             </a:r>
           </a:p>
           <a:p>
@@ -10034,10 +10028,10 @@
                 <a:cs typeface="Arial" panose="020B0604020202020204" pitchFamily="34" charset="0"/>
                 <a:sym typeface="Helvetica Neue"/>
               </a:rPr>
-              <a:t>Survey included Questionnaire of Unpredictability in Childhood (QUIC; cite), the full Confusion, Hubbub, and Order Scale (CHAOS; cite), McLaughlin Deprivation &amp; Threat Scales (cite), the State/Trait Anxiety Inventory (STAI; cite), the Connor-Davidson Resilience Scale (CD-RISC-10; cite), the </a:t>
+              <a:t>Participants completed the QUIC, the full CHAOS, McLaughlin Deprivation &amp; Threat Scales, the STAI, the CD-RISC-10, the Escapism Scale</a:t>
             </a:r>
             <a:r>
-              <a:rPr lang="en-US" sz="3200" dirty="0" err="1">
+              <a:rPr lang="en-US" sz="3200" baseline="30000" dirty="0">
                 <a:solidFill>
                   <a:schemeClr val="dk1"/>
                 </a:solidFill>
@@ -10046,7 +10040,7 @@
                 <a:cs typeface="Arial" panose="020B0604020202020204" pitchFamily="34" charset="0"/>
                 <a:sym typeface="Helvetica Neue"/>
               </a:rPr>
-              <a:t>Escapsim</a:t>
+              <a:t>12</a:t>
             </a:r>
             <a:r>
               <a:rPr lang="en-US" sz="3200" dirty="0">
@@ -10058,7 +10052,31 @@
                 <a:cs typeface="Arial" panose="020B0604020202020204" pitchFamily="34" charset="0"/>
                 <a:sym typeface="Helvetica Neue"/>
               </a:rPr>
-              <a:t> Scale (cite) adapted for music, and the Absorption in Music Scale (cite)</a:t>
+              <a:t> adapted for music, and the Absorption in Music Scale</a:t>
+            </a:r>
+            <a:r>
+              <a:rPr lang="en-US" sz="3200" baseline="30000" dirty="0">
+                <a:solidFill>
+                  <a:schemeClr val="dk1"/>
+                </a:solidFill>
+                <a:latin typeface="Arial" panose="020B0604020202020204" pitchFamily="34" charset="0"/>
+                <a:ea typeface="Helvetica Neue"/>
+                <a:cs typeface="Arial" panose="020B0604020202020204" pitchFamily="34" charset="0"/>
+                <a:sym typeface="Helvetica Neue"/>
+              </a:rPr>
+              <a:t>13</a:t>
+            </a:r>
+            <a:r>
+              <a:rPr lang="en-US" sz="3200" dirty="0">
+                <a:solidFill>
+                  <a:schemeClr val="dk1"/>
+                </a:solidFill>
+                <a:latin typeface="Arial" panose="020B0604020202020204" pitchFamily="34" charset="0"/>
+                <a:ea typeface="Helvetica Neue"/>
+                <a:cs typeface="Arial" panose="020B0604020202020204" pitchFamily="34" charset="0"/>
+                <a:sym typeface="Helvetica Neue"/>
+              </a:rPr>
+              <a:t> (AIMS)</a:t>
             </a:r>
           </a:p>
           <a:p>
@@ -10076,7 +10094,31 @@
                 <a:cs typeface="Arial" panose="020B0604020202020204" pitchFamily="34" charset="0"/>
                 <a:sym typeface="Helvetica Neue"/>
               </a:rPr>
-              <a:t>Participants also completed the Barcelona Music Reward Questionnaire (BMRQ; cite) and the Revised Physical Anhedonia Scale (PAS, cite) in the previous study</a:t>
+              <a:t>Participants also completed the Barcelona Music Reward Questionnaire</a:t>
+            </a:r>
+            <a:r>
+              <a:rPr lang="en-US" sz="3200" baseline="30000" dirty="0">
+                <a:solidFill>
+                  <a:schemeClr val="dk1"/>
+                </a:solidFill>
+                <a:latin typeface="Arial" panose="020B0604020202020204" pitchFamily="34" charset="0"/>
+                <a:ea typeface="Helvetica Neue"/>
+                <a:cs typeface="Arial" panose="020B0604020202020204" pitchFamily="34" charset="0"/>
+                <a:sym typeface="Helvetica Neue"/>
+              </a:rPr>
+              <a:t>14 </a:t>
+            </a:r>
+            <a:r>
+              <a:rPr lang="en-US" sz="3200" dirty="0">
+                <a:solidFill>
+                  <a:schemeClr val="dk1"/>
+                </a:solidFill>
+                <a:latin typeface="Arial" panose="020B0604020202020204" pitchFamily="34" charset="0"/>
+                <a:ea typeface="Helvetica Neue"/>
+                <a:cs typeface="Arial" panose="020B0604020202020204" pitchFamily="34" charset="0"/>
+                <a:sym typeface="Helvetica Neue"/>
+              </a:rPr>
+              <a:t>(BMRQ) in the previous study</a:t>
             </a:r>
           </a:p>
           <a:p>
@@ -10192,7 +10234,7 @@
         </p:nvSpPr>
         <p:spPr>
           <a:xfrm>
-            <a:off x="29248727" y="21777251"/>
+            <a:off x="28936254" y="27687775"/>
             <a:ext cx="13880592" cy="1287417"/>
           </a:xfrm>
           <a:prstGeom prst="rect">
@@ -10253,7 +10295,7 @@
         </p:nvSpPr>
         <p:spPr>
           <a:xfrm>
-            <a:off x="29545638" y="34206160"/>
+            <a:off x="29200935" y="34263905"/>
             <a:ext cx="13877365" cy="1081470"/>
           </a:xfrm>
           <a:prstGeom prst="rect">
@@ -10381,8 +10423,8 @@
         </p:nvSpPr>
         <p:spPr>
           <a:xfrm>
-            <a:off x="651958" y="6907026"/>
-            <a:ext cx="13877365" cy="21337905"/>
+            <a:off x="651958" y="6739762"/>
+            <a:ext cx="13877365" cy="21505169"/>
           </a:xfrm>
           <a:prstGeom prst="rect">
             <a:avLst/>
@@ -10419,6 +10461,18 @@
               </a:rPr>
               <a:t>Music accrues implicit reward value by exploiting reward-prediction mechanisms: listeners tend to prefer music with predictable acoustic and structural features</a:t>
             </a:r>
+            <a:r>
+              <a:rPr lang="en-US" sz="3200" baseline="30000" dirty="0">
+                <a:solidFill>
+                  <a:schemeClr val="dk1"/>
+                </a:solidFill>
+                <a:latin typeface="Arial" panose="020B0604020202020204" pitchFamily="34" charset="0"/>
+                <a:ea typeface="Helvetica Neue"/>
+                <a:cs typeface="Arial" panose="020B0604020202020204" pitchFamily="34" charset="0"/>
+                <a:sym typeface="Helvetica Neue"/>
+              </a:rPr>
+              <a:t>1</a:t>
+            </a:r>
           </a:p>
           <a:p>
             <a:pPr marL="457200" indent="-457200" fontAlgn="base">
@@ -10434,6 +10488,16 @@
                 <a:latin typeface="Arial" panose="020B0604020202020204" pitchFamily="34" charset="0"/>
               </a:rPr>
               <a:t>Pleasurable music listening experiences involve interactions between the auditory and reward systems</a:t>
+            </a:r>
+            <a:r>
+              <a:rPr lang="en-US" sz="3200" b="0" i="0" u="none" strike="noStrike" baseline="30000" dirty="0">
+                <a:solidFill>
+                  <a:srgbClr val="000000"/>
+                </a:solidFill>
+                <a:effectLst/>
+                <a:latin typeface="Arial" panose="020B0604020202020204" pitchFamily="34" charset="0"/>
+              </a:rPr>
+              <a:t>2</a:t>
             </a:r>
           </a:p>
           <a:p>
@@ -10451,7 +10515,43 @@
                 <a:cs typeface="Arial" panose="020B0604020202020204" pitchFamily="34" charset="0"/>
                 <a:sym typeface="Helvetica Neue"/>
               </a:rPr>
-              <a:t>ELA depression/structural brain changes</a:t>
+              <a:t>Experiences of early life adversity (ELA) is associated with higher levels of adult depression</a:t>
+            </a:r>
+            <a:r>
+              <a:rPr lang="en-US" sz="3200" baseline="30000" dirty="0">
+                <a:solidFill>
+                  <a:schemeClr val="dk1"/>
+                </a:solidFill>
+                <a:latin typeface="Arial" panose="020B0604020202020204" pitchFamily="34" charset="0"/>
+                <a:ea typeface="Helvetica Neue"/>
+                <a:cs typeface="Arial" panose="020B0604020202020204" pitchFamily="34" charset="0"/>
+                <a:sym typeface="Helvetica Neue"/>
+              </a:rPr>
+              <a:t>3</a:t>
+            </a:r>
+            <a:r>
+              <a:rPr lang="en-US" sz="3200" dirty="0">
+                <a:solidFill>
+                  <a:schemeClr val="dk1"/>
+                </a:solidFill>
+                <a:latin typeface="Arial" panose="020B0604020202020204" pitchFamily="34" charset="0"/>
+                <a:ea typeface="Helvetica Neue"/>
+                <a:cs typeface="Arial" panose="020B0604020202020204" pitchFamily="34" charset="0"/>
+                <a:sym typeface="Helvetica Neue"/>
+              </a:rPr>
+              <a:t> and blunted responsivity of the reward system during reward anticipation</a:t>
+            </a:r>
+            <a:r>
+              <a:rPr lang="en-US" sz="3200" baseline="30000" dirty="0">
+                <a:solidFill>
+                  <a:schemeClr val="dk1"/>
+                </a:solidFill>
+                <a:latin typeface="Arial" panose="020B0604020202020204" pitchFamily="34" charset="0"/>
+                <a:ea typeface="Helvetica Neue"/>
+                <a:cs typeface="Arial" panose="020B0604020202020204" pitchFamily="34" charset="0"/>
+                <a:sym typeface="Helvetica Neue"/>
+              </a:rPr>
+              <a:t>4</a:t>
             </a:r>
           </a:p>
           <a:p>
@@ -10469,128 +10569,8 @@
                 <a:cs typeface="Arial" panose="020B0604020202020204" pitchFamily="34" charset="0"/>
                 <a:sym typeface="Helvetica Neue"/>
               </a:rPr>
-              <a:t>Connection</a:t>
+              <a:t>Exposure to ELA may blunt music-reward responsivity and enjoyment of music</a:t>
             </a:r>
-          </a:p>
-          <a:p>
-            <a:pPr fontAlgn="base"/>
-            <a:endParaRPr lang="en-US" sz="3200" dirty="0">
-              <a:solidFill>
-                <a:schemeClr val="dk1"/>
-              </a:solidFill>
-              <a:latin typeface="Arial" panose="020B0604020202020204" pitchFamily="34" charset="0"/>
-              <a:ea typeface="Helvetica Neue"/>
-              <a:cs typeface="Arial" panose="020B0604020202020204" pitchFamily="34" charset="0"/>
-              <a:sym typeface="Helvetica Neue"/>
-            </a:endParaRPr>
-          </a:p>
-          <a:p>
-            <a:pPr fontAlgn="base"/>
-            <a:endParaRPr lang="en-US" sz="3200" dirty="0">
-              <a:solidFill>
-                <a:schemeClr val="dk1"/>
-              </a:solidFill>
-              <a:latin typeface="Arial" panose="020B0604020202020204" pitchFamily="34" charset="0"/>
-              <a:ea typeface="Helvetica Neue"/>
-              <a:cs typeface="Arial" panose="020B0604020202020204" pitchFamily="34" charset="0"/>
-              <a:sym typeface="Helvetica Neue"/>
-            </a:endParaRPr>
-          </a:p>
-          <a:p>
-            <a:pPr fontAlgn="base"/>
-            <a:endParaRPr lang="en-US" sz="3200" dirty="0">
-              <a:solidFill>
-                <a:schemeClr val="dk1"/>
-              </a:solidFill>
-              <a:latin typeface="Arial" panose="020B0604020202020204" pitchFamily="34" charset="0"/>
-              <a:ea typeface="Helvetica Neue"/>
-              <a:cs typeface="Arial" panose="020B0604020202020204" pitchFamily="34" charset="0"/>
-              <a:sym typeface="Helvetica Neue"/>
-            </a:endParaRPr>
-          </a:p>
-          <a:p>
-            <a:pPr fontAlgn="base"/>
-            <a:endParaRPr lang="en-US" sz="3200" dirty="0">
-              <a:solidFill>
-                <a:schemeClr val="dk1"/>
-              </a:solidFill>
-              <a:latin typeface="Arial" panose="020B0604020202020204" pitchFamily="34" charset="0"/>
-              <a:ea typeface="Helvetica Neue"/>
-              <a:cs typeface="Arial" panose="020B0604020202020204" pitchFamily="34" charset="0"/>
-              <a:sym typeface="Helvetica Neue"/>
-            </a:endParaRPr>
-          </a:p>
-          <a:p>
-            <a:pPr fontAlgn="base"/>
-            <a:endParaRPr lang="en-US" sz="3200" dirty="0">
-              <a:solidFill>
-                <a:schemeClr val="dk1"/>
-              </a:solidFill>
-              <a:latin typeface="Arial" panose="020B0604020202020204" pitchFamily="34" charset="0"/>
-              <a:ea typeface="Helvetica Neue"/>
-              <a:cs typeface="Arial" panose="020B0604020202020204" pitchFamily="34" charset="0"/>
-              <a:sym typeface="Helvetica Neue"/>
-            </a:endParaRPr>
-          </a:p>
-          <a:p>
-            <a:pPr fontAlgn="base"/>
-            <a:endParaRPr lang="en-US" sz="3200" dirty="0">
-              <a:solidFill>
-                <a:schemeClr val="dk1"/>
-              </a:solidFill>
-              <a:latin typeface="Arial" panose="020B0604020202020204" pitchFamily="34" charset="0"/>
-              <a:ea typeface="Helvetica Neue"/>
-              <a:cs typeface="Arial" panose="020B0604020202020204" pitchFamily="34" charset="0"/>
-              <a:sym typeface="Helvetica Neue"/>
-            </a:endParaRPr>
-          </a:p>
-          <a:p>
-            <a:pPr fontAlgn="base"/>
-            <a:endParaRPr lang="en-US" sz="3200" dirty="0">
-              <a:solidFill>
-                <a:schemeClr val="dk1"/>
-              </a:solidFill>
-              <a:latin typeface="Arial" panose="020B0604020202020204" pitchFamily="34" charset="0"/>
-              <a:ea typeface="Helvetica Neue"/>
-              <a:cs typeface="Arial" panose="020B0604020202020204" pitchFamily="34" charset="0"/>
-              <a:sym typeface="Helvetica Neue"/>
-            </a:endParaRPr>
-          </a:p>
-          <a:p>
-            <a:pPr fontAlgn="base"/>
-            <a:endParaRPr lang="en-US" sz="3200" dirty="0">
-              <a:solidFill>
-                <a:schemeClr val="dk1"/>
-              </a:solidFill>
-              <a:latin typeface="Arial" panose="020B0604020202020204" pitchFamily="34" charset="0"/>
-              <a:ea typeface="Helvetica Neue"/>
-              <a:cs typeface="Arial" panose="020B0604020202020204" pitchFamily="34" charset="0"/>
-              <a:sym typeface="Helvetica Neue"/>
-            </a:endParaRPr>
-          </a:p>
-          <a:p>
-            <a:pPr fontAlgn="base"/>
-            <a:endParaRPr lang="en-US" sz="3200" dirty="0">
-              <a:solidFill>
-                <a:schemeClr val="dk1"/>
-              </a:solidFill>
-              <a:latin typeface="Arial" panose="020B0604020202020204" pitchFamily="34" charset="0"/>
-              <a:ea typeface="Helvetica Neue"/>
-              <a:cs typeface="Arial" panose="020B0604020202020204" pitchFamily="34" charset="0"/>
-              <a:sym typeface="Helvetica Neue"/>
-            </a:endParaRPr>
-          </a:p>
-          <a:p>
-            <a:pPr fontAlgn="base"/>
-            <a:endParaRPr lang="en-US" sz="3200" dirty="0">
-              <a:solidFill>
-                <a:schemeClr val="dk1"/>
-              </a:solidFill>
-              <a:latin typeface="Arial" panose="020B0604020202020204" pitchFamily="34" charset="0"/>
-              <a:ea typeface="Helvetica Neue"/>
-              <a:cs typeface="Arial" panose="020B0604020202020204" pitchFamily="34" charset="0"/>
-              <a:sym typeface="Helvetica Neue"/>
-            </a:endParaRPr>
           </a:p>
           <a:p>
             <a:pPr fontAlgn="base"/>
@@ -10691,7 +10671,7 @@
                 <a:cs typeface="Arial" panose="020B0604020202020204" pitchFamily="34" charset="0"/>
                 <a:sym typeface="Helvetica Neue"/>
               </a:rPr>
-              <a:t>254 participants (140F) recruited through Prolific from a previous experiment in our lab completed the study on Qualtrics</a:t>
+              <a:t>254 participants (140F) recruited from a previous experiment</a:t>
             </a:r>
           </a:p>
           <a:p>
@@ -10709,7 +10689,151 @@
                 <a:cs typeface="Arial" panose="020B0604020202020204" pitchFamily="34" charset="0"/>
                 <a:sym typeface="Helvetica Neue"/>
               </a:rPr>
-              <a:t>Survey included Questionnaire of Unpredictability in Childhood (QUIC; cite), the short-form Confusion, Hubbub, and Order Scale (CHAOS; cite), McLaughlin Deprivation &amp; Threat Scales (cite), Healthy-Unhealthy Music Scale (HUMS; cite), the State/Trait Anxiety Inventory (STAI; cite), the Connor-Davidson Resilience Scale (CD-RISC-10; cite)</a:t>
+              <a:t>Participants completed the Questionnaire of Unpredictability in Childhood</a:t>
+            </a:r>
+            <a:r>
+              <a:rPr lang="en-US" sz="3200" baseline="30000" dirty="0">
+                <a:solidFill>
+                  <a:schemeClr val="dk1"/>
+                </a:solidFill>
+                <a:latin typeface="Arial" panose="020B0604020202020204" pitchFamily="34" charset="0"/>
+                <a:ea typeface="Helvetica Neue"/>
+                <a:cs typeface="Arial" panose="020B0604020202020204" pitchFamily="34" charset="0"/>
+                <a:sym typeface="Helvetica Neue"/>
+              </a:rPr>
+              <a:t>5</a:t>
+            </a:r>
+            <a:r>
+              <a:rPr lang="en-US" sz="3200" dirty="0">
+                <a:solidFill>
+                  <a:schemeClr val="dk1"/>
+                </a:solidFill>
+                <a:latin typeface="Arial" panose="020B0604020202020204" pitchFamily="34" charset="0"/>
+                <a:ea typeface="Helvetica Neue"/>
+                <a:cs typeface="Arial" panose="020B0604020202020204" pitchFamily="34" charset="0"/>
+                <a:sym typeface="Helvetica Neue"/>
+              </a:rPr>
+              <a:t> (QUIC), the short-form Confusion, Hubbub, and Order Scale</a:t>
+            </a:r>
+            <a:r>
+              <a:rPr lang="en-US" sz="3200" baseline="30000" dirty="0">
+                <a:solidFill>
+                  <a:schemeClr val="dk1"/>
+                </a:solidFill>
+                <a:latin typeface="Arial" panose="020B0604020202020204" pitchFamily="34" charset="0"/>
+                <a:ea typeface="Helvetica Neue"/>
+                <a:cs typeface="Arial" panose="020B0604020202020204" pitchFamily="34" charset="0"/>
+                <a:sym typeface="Helvetica Neue"/>
+              </a:rPr>
+              <a:t>6</a:t>
+            </a:r>
+            <a:r>
+              <a:rPr lang="en-US" sz="3200" dirty="0">
+                <a:solidFill>
+                  <a:schemeClr val="dk1"/>
+                </a:solidFill>
+                <a:latin typeface="Arial" panose="020B0604020202020204" pitchFamily="34" charset="0"/>
+                <a:ea typeface="Helvetica Neue"/>
+                <a:cs typeface="Arial" panose="020B0604020202020204" pitchFamily="34" charset="0"/>
+                <a:sym typeface="Helvetica Neue"/>
+              </a:rPr>
+              <a:t> (CHAOS), McLaughlin Deprivation &amp; Threat Scales</a:t>
+            </a:r>
+            <a:r>
+              <a:rPr lang="en-US" sz="3200" baseline="30000" dirty="0">
+                <a:solidFill>
+                  <a:schemeClr val="dk1"/>
+                </a:solidFill>
+                <a:latin typeface="Arial" panose="020B0604020202020204" pitchFamily="34" charset="0"/>
+                <a:ea typeface="Helvetica Neue"/>
+                <a:cs typeface="Arial" panose="020B0604020202020204" pitchFamily="34" charset="0"/>
+                <a:sym typeface="Helvetica Neue"/>
+              </a:rPr>
+              <a:t>7</a:t>
+            </a:r>
+            <a:r>
+              <a:rPr lang="en-US" sz="3200" dirty="0">
+                <a:solidFill>
+                  <a:schemeClr val="dk1"/>
+                </a:solidFill>
+                <a:latin typeface="Arial" panose="020B0604020202020204" pitchFamily="34" charset="0"/>
+                <a:ea typeface="Helvetica Neue"/>
+                <a:cs typeface="Arial" panose="020B0604020202020204" pitchFamily="34" charset="0"/>
+                <a:sym typeface="Helvetica Neue"/>
+              </a:rPr>
+              <a:t>, Healthy-Unhealthy Music Scale</a:t>
+            </a:r>
+            <a:r>
+              <a:rPr lang="en-US" sz="3200" baseline="30000" dirty="0">
+                <a:solidFill>
+                  <a:schemeClr val="dk1"/>
+                </a:solidFill>
+                <a:latin typeface="Arial" panose="020B0604020202020204" pitchFamily="34" charset="0"/>
+                <a:ea typeface="Helvetica Neue"/>
+                <a:cs typeface="Arial" panose="020B0604020202020204" pitchFamily="34" charset="0"/>
+                <a:sym typeface="Helvetica Neue"/>
+              </a:rPr>
+              <a:t>8</a:t>
+            </a:r>
+            <a:r>
+              <a:rPr lang="en-US" sz="3200" dirty="0">
+                <a:solidFill>
+                  <a:schemeClr val="dk1"/>
+                </a:solidFill>
+                <a:latin typeface="Arial" panose="020B0604020202020204" pitchFamily="34" charset="0"/>
+                <a:ea typeface="Helvetica Neue"/>
+                <a:cs typeface="Arial" panose="020B0604020202020204" pitchFamily="34" charset="0"/>
+                <a:sym typeface="Helvetica Neue"/>
+              </a:rPr>
+              <a:t> (HUMS), the State/Trait Anxiety Inventory</a:t>
+            </a:r>
+            <a:r>
+              <a:rPr lang="en-US" sz="3200" baseline="30000" dirty="0">
+                <a:solidFill>
+                  <a:schemeClr val="dk1"/>
+                </a:solidFill>
+                <a:latin typeface="Arial" panose="020B0604020202020204" pitchFamily="34" charset="0"/>
+                <a:ea typeface="Helvetica Neue"/>
+                <a:cs typeface="Arial" panose="020B0604020202020204" pitchFamily="34" charset="0"/>
+                <a:sym typeface="Helvetica Neue"/>
+              </a:rPr>
+              <a:t>9</a:t>
+            </a:r>
+            <a:r>
+              <a:rPr lang="en-US" sz="3200" dirty="0">
+                <a:solidFill>
+                  <a:schemeClr val="dk1"/>
+                </a:solidFill>
+                <a:latin typeface="Arial" panose="020B0604020202020204" pitchFamily="34" charset="0"/>
+                <a:ea typeface="Helvetica Neue"/>
+                <a:cs typeface="Arial" panose="020B0604020202020204" pitchFamily="34" charset="0"/>
+                <a:sym typeface="Helvetica Neue"/>
+              </a:rPr>
+              <a:t> (STAI), the Connor-Davidson Resilience Scale</a:t>
+            </a:r>
+            <a:r>
+              <a:rPr lang="en-US" sz="3200" baseline="30000" dirty="0">
+                <a:solidFill>
+                  <a:schemeClr val="dk1"/>
+                </a:solidFill>
+                <a:latin typeface="Arial" panose="020B0604020202020204" pitchFamily="34" charset="0"/>
+                <a:ea typeface="Helvetica Neue"/>
+                <a:cs typeface="Arial" panose="020B0604020202020204" pitchFamily="34" charset="0"/>
+                <a:sym typeface="Helvetica Neue"/>
+              </a:rPr>
+              <a:t>10</a:t>
+            </a:r>
+            <a:r>
+              <a:rPr lang="en-US" sz="3200" dirty="0">
+                <a:solidFill>
+                  <a:schemeClr val="dk1"/>
+                </a:solidFill>
+                <a:latin typeface="Arial" panose="020B0604020202020204" pitchFamily="34" charset="0"/>
+                <a:ea typeface="Helvetica Neue"/>
+                <a:cs typeface="Arial" panose="020B0604020202020204" pitchFamily="34" charset="0"/>
+                <a:sym typeface="Helvetica Neue"/>
+              </a:rPr>
+              <a:t> (CD-RISC-10)</a:t>
             </a:r>
           </a:p>
           <a:p>
@@ -10745,7 +10869,31 @@
                 <a:cs typeface="Arial" panose="020B0604020202020204" pitchFamily="34" charset="0"/>
                 <a:sym typeface="Helvetica Neue"/>
               </a:rPr>
-              <a:t>Participants also completed the Extended Barcelona Music Reward Questionnaire (</a:t>
+              <a:t>Participants also completed the Extended Barcelona Music Reward Questionnaire</a:t>
+            </a:r>
+            <a:r>
+              <a:rPr lang="en-US" sz="3200" baseline="30000" dirty="0">
+                <a:solidFill>
+                  <a:schemeClr val="dk1"/>
+                </a:solidFill>
+                <a:latin typeface="Arial" panose="020B0604020202020204" pitchFamily="34" charset="0"/>
+                <a:ea typeface="Helvetica Neue"/>
+                <a:cs typeface="Arial" panose="020B0604020202020204" pitchFamily="34" charset="0"/>
+                <a:sym typeface="Helvetica Neue"/>
+              </a:rPr>
+              <a:t>11</a:t>
+            </a:r>
+            <a:r>
+              <a:rPr lang="en-US" sz="3200" dirty="0">
+                <a:solidFill>
+                  <a:schemeClr val="dk1"/>
+                </a:solidFill>
+                <a:latin typeface="Arial" panose="020B0604020202020204" pitchFamily="34" charset="0"/>
+                <a:ea typeface="Helvetica Neue"/>
+                <a:cs typeface="Arial" panose="020B0604020202020204" pitchFamily="34" charset="0"/>
+                <a:sym typeface="Helvetica Neue"/>
+              </a:rPr>
+              <a:t> (</a:t>
             </a:r>
             <a:r>
               <a:rPr lang="en-US" sz="3200" dirty="0" err="1">
@@ -10769,7 +10917,7 @@
                 <a:cs typeface="Arial" panose="020B0604020202020204" pitchFamily="34" charset="0"/>
                 <a:sym typeface="Helvetica Neue"/>
               </a:rPr>
-              <a:t>; cite) and the Revised Physical Anhedonia Scale (PAS, cite) in the previous study</a:t>
+              <a:t>) in the previous study</a:t>
             </a:r>
           </a:p>
         </p:txBody>
@@ -10832,7 +10980,7 @@
                 <a:cs typeface="Arial" panose="020B0604020202020204" pitchFamily="34" charset="0"/>
                 <a:sym typeface="Helvetica Neue"/>
               </a:rPr>
-              <a:t>Absorption related to reports of escapism above effects of other facets of music reward</a:t>
+              <a:t>Absorption relates to reports of escapism above effects of other facets of music reward</a:t>
             </a:r>
             <a:endParaRPr lang="en-US" sz="5200" dirty="0">
               <a:latin typeface="Arial" panose="020B0604020202020204" pitchFamily="34" charset="0"/>
@@ -10855,7 +11003,7 @@
         </p:nvSpPr>
         <p:spPr>
           <a:xfrm>
-            <a:off x="616765" y="17113420"/>
+            <a:off x="616765" y="13665035"/>
             <a:ext cx="13877365" cy="1289304"/>
           </a:xfrm>
           <a:prstGeom prst="rect">
@@ -10922,7 +11070,7 @@
         </p:nvSpPr>
         <p:spPr>
           <a:xfrm>
-            <a:off x="14747968" y="23143912"/>
+            <a:off x="14812450" y="22298998"/>
             <a:ext cx="13880592" cy="1287418"/>
           </a:xfrm>
           <a:prstGeom prst="rect">
@@ -10997,53 +11145,6 @@
           </a:prstGeom>
         </p:spPr>
       </p:pic>
-      <p:sp>
-        <p:nvSpPr>
-          <p:cNvPr id="57" name="Google Shape;87;p1">
-            <a:extLst>
-              <a:ext uri="{FF2B5EF4-FFF2-40B4-BE49-F238E27FC236}">
-                <a16:creationId xmlns:a16="http://schemas.microsoft.com/office/drawing/2014/main" id="{EE592F8E-5CCF-2940-8C7A-A0E281FD34A3}"/>
-              </a:ext>
-            </a:extLst>
-          </p:cNvPr>
-          <p:cNvSpPr/>
-          <p:nvPr/>
-        </p:nvSpPr>
-        <p:spPr>
-          <a:xfrm>
-            <a:off x="492317" y="21636147"/>
-            <a:ext cx="13880592" cy="13802133"/>
-          </a:xfrm>
-          <a:prstGeom prst="rect">
-            <a:avLst/>
-          </a:prstGeom>
-          <a:noFill/>
-          <a:ln w="12700" cap="flat" cmpd="sng">
-            <a:noFill/>
-            <a:prstDash val="solid"/>
-            <a:miter lim="800000"/>
-            <a:headEnd type="none" w="sm" len="sm"/>
-            <a:tailEnd type="none" w="sm" len="sm"/>
-          </a:ln>
-          <a:effectLst/>
-        </p:spPr>
-        <p:txBody>
-          <a:bodyPr spcFirstLastPara="1" wrap="square" lIns="274300" tIns="45700" rIns="274300" bIns="45700" anchor="t" anchorCtr="0">
-            <a:noAutofit/>
-          </a:bodyPr>
-          <a:lstStyle/>
-          <a:p>
-            <a:pPr lvl="1" algn="just" fontAlgn="base"/>
-            <a:endParaRPr lang="en-US" sz="3200" b="0" i="0" u="none" strike="noStrike" dirty="0">
-              <a:solidFill>
-                <a:srgbClr val="000000"/>
-              </a:solidFill>
-              <a:effectLst/>
-              <a:latin typeface="Arial" panose="020B0604020202020204" pitchFamily="34" charset="0"/>
-            </a:endParaRPr>
-          </a:p>
-        </p:txBody>
-      </p:sp>
       <p:pic>
         <p:nvPicPr>
           <p:cNvPr id="58" name="Picture 57">
@@ -11191,7 +11292,7 @@
         </p:nvSpPr>
         <p:spPr>
           <a:xfrm>
-            <a:off x="398649" y="26259324"/>
+            <a:off x="451687" y="20342109"/>
             <a:ext cx="13880592" cy="2813112"/>
           </a:xfrm>
           <a:prstGeom prst="rect">
@@ -11227,7 +11328,7 @@
                 <a:cs typeface="Arial" panose="020B0604020202020204" pitchFamily="34" charset="0"/>
                 <a:sym typeface="Helvetica Neue"/>
               </a:rPr>
-              <a:t>All dimensions of ELA (sum-scored) are positively associated with reports of absorption into music</a:t>
+              <a:t>All dimensions of ELA are positively associated with reports of absorption into music</a:t>
             </a:r>
             <a:endParaRPr lang="en-US" sz="5200" dirty="0">
               <a:latin typeface="Arial" panose="020B0604020202020204" pitchFamily="34" charset="0"/>
@@ -11250,7 +11351,7 @@
         </p:nvSpPr>
         <p:spPr>
           <a:xfrm>
-            <a:off x="14529323" y="29934758"/>
+            <a:off x="14924833" y="27566828"/>
             <a:ext cx="13880592" cy="2004578"/>
           </a:xfrm>
           <a:prstGeom prst="rect">
@@ -11286,7 +11387,7 @@
                 <a:cs typeface="Arial" panose="020B0604020202020204" pitchFamily="34" charset="0"/>
                 <a:sym typeface="Helvetica Neue"/>
               </a:rPr>
-              <a:t>Absorption in music again positively associated with CHAOS and Threat Scores</a:t>
+              <a:t>AIMS scores positively associated with CHAOS and Threat Scores</a:t>
             </a:r>
             <a:endParaRPr lang="en-US" sz="5200" dirty="0">
               <a:latin typeface="Arial" panose="020B0604020202020204" pitchFamily="34" charset="0"/>
@@ -11386,7 +11487,7 @@
         </p:nvSpPr>
         <p:spPr>
           <a:xfrm>
-            <a:off x="14815358" y="21501340"/>
+            <a:off x="14815677" y="20622373"/>
             <a:ext cx="13880592" cy="1676625"/>
           </a:xfrm>
           <a:prstGeom prst="rect">
@@ -11531,98 +11632,8 @@
         </p:blipFill>
         <p:spPr>
           <a:xfrm>
-            <a:off x="14976678" y="8470042"/>
-            <a:ext cx="6775702" cy="6775702"/>
-          </a:xfrm>
-          <a:prstGeom prst="rect">
-            <a:avLst/>
-          </a:prstGeom>
-        </p:spPr>
-      </p:pic>
-      <p:pic>
-        <p:nvPicPr>
-          <p:cNvPr id="15" name="Picture 14" descr="A picture containing text, screenshot, line, parallel&#10;&#10;Description automatically generated">
-            <a:extLst>
-              <a:ext uri="{FF2B5EF4-FFF2-40B4-BE49-F238E27FC236}">
-                <a16:creationId xmlns:a16="http://schemas.microsoft.com/office/drawing/2014/main" id="{F86B01E1-3524-FEC2-58A8-BEA8B78D2D3A}"/>
-              </a:ext>
-            </a:extLst>
-          </p:cNvPr>
-          <p:cNvPicPr>
-            <a:picLocks noChangeAspect="1"/>
-          </p:cNvPicPr>
-          <p:nvPr/>
-        </p:nvPicPr>
-        <p:blipFill>
-          <a:blip r:embed="rId10"/>
-          <a:stretch>
-            <a:fillRect/>
-          </a:stretch>
-        </p:blipFill>
-        <p:spPr>
-          <a:xfrm>
-            <a:off x="21688264" y="8843768"/>
-            <a:ext cx="6400800" cy="6400800"/>
-          </a:xfrm>
-          <a:prstGeom prst="rect">
-            <a:avLst/>
-          </a:prstGeom>
-        </p:spPr>
-      </p:pic>
-      <p:pic>
-        <p:nvPicPr>
-          <p:cNvPr id="17" name="Picture 16" descr="A close up of a logo&#10;&#10;Description automatically generated with low confidence">
-            <a:extLst>
-              <a:ext uri="{FF2B5EF4-FFF2-40B4-BE49-F238E27FC236}">
-                <a16:creationId xmlns:a16="http://schemas.microsoft.com/office/drawing/2014/main" id="{D6451C49-D796-F0AF-E970-0C598B4ACC0A}"/>
-              </a:ext>
-            </a:extLst>
-          </p:cNvPr>
-          <p:cNvPicPr>
-            <a:picLocks noChangeAspect="1"/>
-          </p:cNvPicPr>
-          <p:nvPr/>
-        </p:nvPicPr>
-        <p:blipFill>
-          <a:blip r:embed="rId11"/>
-          <a:stretch>
-            <a:fillRect/>
-          </a:stretch>
-        </p:blipFill>
-        <p:spPr>
-          <a:xfrm>
-            <a:off x="22650732" y="9795310"/>
-            <a:ext cx="1391543" cy="463848"/>
-          </a:xfrm>
-          <a:prstGeom prst="rect">
-            <a:avLst/>
-          </a:prstGeom>
-        </p:spPr>
-      </p:pic>
-      <p:pic>
-        <p:nvPicPr>
-          <p:cNvPr id="21" name="Picture 20" descr="A picture containing font, logo, graphics, text&#10;&#10;Description automatically generated">
-            <a:extLst>
-              <a:ext uri="{FF2B5EF4-FFF2-40B4-BE49-F238E27FC236}">
-                <a16:creationId xmlns:a16="http://schemas.microsoft.com/office/drawing/2014/main" id="{239A3BC9-37BB-6C25-4901-150568CD9E33}"/>
-              </a:ext>
-            </a:extLst>
-          </p:cNvPr>
-          <p:cNvPicPr>
-            <a:picLocks noChangeAspect="1"/>
-          </p:cNvPicPr>
-          <p:nvPr/>
-        </p:nvPicPr>
-        <p:blipFill>
-          <a:blip r:embed="rId12"/>
-          <a:stretch>
-            <a:fillRect/>
-          </a:stretch>
-        </p:blipFill>
-        <p:spPr>
-          <a:xfrm>
-            <a:off x="26654468" y="9779584"/>
-            <a:ext cx="1257300" cy="495300"/>
+            <a:off x="14764551" y="8265866"/>
+            <a:ext cx="7162203" cy="7162203"/>
           </a:xfrm>
           <a:prstGeom prst="rect">
             <a:avLst/>
@@ -11644,15 +11655,15 @@
           <p:nvPr/>
         </p:nvPicPr>
         <p:blipFill>
-          <a:blip r:embed="rId13"/>
+          <a:blip r:embed="rId10"/>
           <a:stretch>
             <a:fillRect/>
           </a:stretch>
         </p:blipFill>
         <p:spPr>
           <a:xfrm>
-            <a:off x="17482457" y="30772611"/>
-            <a:ext cx="7054272" cy="7054272"/>
+            <a:off x="16693639" y="28331484"/>
+            <a:ext cx="10118213" cy="10118213"/>
           </a:xfrm>
           <a:prstGeom prst="rect">
             <a:avLst/>
@@ -11674,14 +11685,14 @@
           <p:nvPr/>
         </p:nvPicPr>
         <p:blipFill>
-          <a:blip r:embed="rId14"/>
+          <a:blip r:embed="rId11"/>
           <a:stretch>
             <a:fillRect/>
           </a:stretch>
         </p:blipFill>
         <p:spPr>
           <a:xfrm>
-            <a:off x="30368447" y="8247327"/>
+            <a:off x="30382259" y="8247327"/>
             <a:ext cx="10930901" cy="7651631"/>
           </a:xfrm>
           <a:prstGeom prst="rect">
@@ -11704,6 +11715,163 @@
           <p:nvPr/>
         </p:nvPicPr>
         <p:blipFill>
+          <a:blip r:embed="rId12"/>
+          <a:stretch>
+            <a:fillRect/>
+          </a:stretch>
+        </p:blipFill>
+        <p:spPr>
+          <a:xfrm>
+            <a:off x="655355" y="22942707"/>
+            <a:ext cx="13250054" cy="13250054"/>
+          </a:xfrm>
+          <a:prstGeom prst="rect">
+            <a:avLst/>
+          </a:prstGeom>
+        </p:spPr>
+      </p:pic>
+      <p:sp>
+        <p:nvSpPr>
+          <p:cNvPr id="2" name="Google Shape;165;p1">
+            <a:extLst>
+              <a:ext uri="{FF2B5EF4-FFF2-40B4-BE49-F238E27FC236}">
+                <a16:creationId xmlns:a16="http://schemas.microsoft.com/office/drawing/2014/main" id="{FF227B2E-5599-8C83-07D3-0299200FF901}"/>
+              </a:ext>
+            </a:extLst>
+          </p:cNvPr>
+          <p:cNvSpPr/>
+          <p:nvPr/>
+        </p:nvSpPr>
+        <p:spPr>
+          <a:xfrm>
+            <a:off x="28893601" y="16087115"/>
+            <a:ext cx="13880592" cy="1837150"/>
+          </a:xfrm>
+          <a:prstGeom prst="rect">
+            <a:avLst/>
+          </a:prstGeom>
+          <a:solidFill>
+            <a:schemeClr val="accent6">
+              <a:lumMod val="50000"/>
+            </a:schemeClr>
+          </a:solidFill>
+          <a:ln w="12700" cap="flat" cmpd="sng">
+            <a:noFill/>
+            <a:prstDash val="solid"/>
+            <a:miter lim="800000"/>
+            <a:headEnd type="none" w="sm" len="sm"/>
+            <a:tailEnd type="none" w="sm" len="sm"/>
+          </a:ln>
+        </p:spPr>
+        <p:txBody>
+          <a:bodyPr spcFirstLastPara="1" wrap="square" lIns="91425" tIns="45700" rIns="91425" bIns="45700" anchor="ctr" anchorCtr="0">
+            <a:noAutofit/>
+          </a:bodyPr>
+          <a:lstStyle/>
+          <a:p>
+            <a:pPr marL="0" marR="0" lvl="0" indent="0" algn="ctr" rtl="0">
+              <a:spcBef>
+                <a:spcPts val="0"/>
+              </a:spcBef>
+              <a:spcAft>
+                <a:spcPts val="0"/>
+              </a:spcAft>
+              <a:buNone/>
+            </a:pPr>
+            <a:r>
+              <a:rPr lang="en-US" sz="5200" b="1" dirty="0">
+                <a:solidFill>
+                  <a:schemeClr val="lt1"/>
+                </a:solidFill>
+                <a:latin typeface="Arial" panose="020B0604020202020204" pitchFamily="34" charset="0"/>
+                <a:ea typeface="Helvetica Neue"/>
+                <a:cs typeface="Arial" panose="020B0604020202020204" pitchFamily="34" charset="0"/>
+                <a:sym typeface="Helvetica Neue"/>
+              </a:rPr>
+              <a:t>Absorption mediates the relationship between CHAOS &amp; resilience</a:t>
+            </a:r>
+            <a:endParaRPr lang="en-US" sz="5200" dirty="0">
+              <a:latin typeface="Arial" panose="020B0604020202020204" pitchFamily="34" charset="0"/>
+              <a:cs typeface="Arial" panose="020B0604020202020204" pitchFamily="34" charset="0"/>
+            </a:endParaRPr>
+          </a:p>
+        </p:txBody>
+      </p:sp>
+      <p:pic>
+        <p:nvPicPr>
+          <p:cNvPr id="27" name="Picture 26" descr="A graph of different colored lines&#10;&#10;Description automatically generated">
+            <a:extLst>
+              <a:ext uri="{FF2B5EF4-FFF2-40B4-BE49-F238E27FC236}">
+                <a16:creationId xmlns:a16="http://schemas.microsoft.com/office/drawing/2014/main" id="{AB590D1F-719B-BE6A-E5F6-73E51428B663}"/>
+              </a:ext>
+            </a:extLst>
+          </p:cNvPr>
+          <p:cNvPicPr>
+            <a:picLocks noChangeAspect="1"/>
+          </p:cNvPicPr>
+          <p:nvPr/>
+        </p:nvPicPr>
+        <p:blipFill>
+          <a:blip r:embed="rId13"/>
+          <a:stretch>
+            <a:fillRect/>
+          </a:stretch>
+        </p:blipFill>
+        <p:spPr>
+          <a:xfrm>
+            <a:off x="21725029" y="8265866"/>
+            <a:ext cx="7162203" cy="7162203"/>
+          </a:xfrm>
+          <a:prstGeom prst="rect">
+            <a:avLst/>
+          </a:prstGeom>
+        </p:spPr>
+      </p:pic>
+      <p:pic>
+        <p:nvPicPr>
+          <p:cNvPr id="23" name="Picture 22" descr="A close up of a logo&#10;&#10;Description automatically generated">
+            <a:extLst>
+              <a:ext uri="{FF2B5EF4-FFF2-40B4-BE49-F238E27FC236}">
+                <a16:creationId xmlns:a16="http://schemas.microsoft.com/office/drawing/2014/main" id="{E5737A8C-1D44-A09A-D46E-986F07E20D6A}"/>
+              </a:ext>
+            </a:extLst>
+          </p:cNvPr>
+          <p:cNvPicPr>
+            <a:picLocks noChangeAspect="1"/>
+          </p:cNvPicPr>
+          <p:nvPr/>
+        </p:nvPicPr>
+        <p:blipFill>
+          <a:blip r:embed="rId14"/>
+          <a:stretch>
+            <a:fillRect/>
+          </a:stretch>
+        </p:blipFill>
+        <p:spPr>
+          <a:xfrm>
+            <a:off x="22633117" y="9215335"/>
+            <a:ext cx="1295400" cy="431800"/>
+          </a:xfrm>
+          <a:prstGeom prst="rect">
+            <a:avLst/>
+          </a:prstGeom>
+        </p:spPr>
+      </p:pic>
+      <p:pic>
+        <p:nvPicPr>
+          <p:cNvPr id="25" name="Picture 24" descr="A blue rectangle with text&#10;&#10;Description automatically generated">
+            <a:extLst>
+              <a:ext uri="{FF2B5EF4-FFF2-40B4-BE49-F238E27FC236}">
+                <a16:creationId xmlns:a16="http://schemas.microsoft.com/office/drawing/2014/main" id="{64678E41-E55F-A60D-5810-0E680CD25B07}"/>
+              </a:ext>
+            </a:extLst>
+          </p:cNvPr>
+          <p:cNvPicPr>
+            <a:picLocks noChangeAspect="1"/>
+          </p:cNvPicPr>
+          <p:nvPr/>
+        </p:nvPicPr>
+        <p:blipFill>
           <a:blip r:embed="rId15"/>
           <a:stretch>
             <a:fillRect/>
@@ -11711,8 +11879,212 @@
         </p:blipFill>
         <p:spPr>
           <a:xfrm>
-            <a:off x="2195951" y="29224877"/>
-            <a:ext cx="9068661" cy="9068661"/>
+            <a:off x="27152615" y="9151835"/>
+            <a:ext cx="1257300" cy="495300"/>
+          </a:xfrm>
+          <a:prstGeom prst="rect">
+            <a:avLst/>
+          </a:prstGeom>
+        </p:spPr>
+      </p:pic>
+      <p:sp>
+        <p:nvSpPr>
+          <p:cNvPr id="28" name="Google Shape;87;p1">
+            <a:extLst>
+              <a:ext uri="{FF2B5EF4-FFF2-40B4-BE49-F238E27FC236}">
+                <a16:creationId xmlns:a16="http://schemas.microsoft.com/office/drawing/2014/main" id="{AC59D481-580E-43E7-98DC-1C0329625833}"/>
+              </a:ext>
+            </a:extLst>
+          </p:cNvPr>
+          <p:cNvSpPr/>
+          <p:nvPr/>
+        </p:nvSpPr>
+        <p:spPr>
+          <a:xfrm>
+            <a:off x="28985004" y="25588584"/>
+            <a:ext cx="13877365" cy="8675319"/>
+          </a:xfrm>
+          <a:prstGeom prst="rect">
+            <a:avLst/>
+          </a:prstGeom>
+          <a:noFill/>
+          <a:ln w="12700" cap="flat" cmpd="sng">
+            <a:noFill/>
+            <a:prstDash val="solid"/>
+            <a:miter lim="800000"/>
+            <a:headEnd type="none" w="sm" len="sm"/>
+            <a:tailEnd type="none" w="sm" len="sm"/>
+          </a:ln>
+          <a:effectLst/>
+        </p:spPr>
+        <p:txBody>
+          <a:bodyPr spcFirstLastPara="1" wrap="square" lIns="274300" tIns="45700" rIns="274300" bIns="45700" anchor="t" anchorCtr="0">
+            <a:noAutofit/>
+          </a:bodyPr>
+          <a:lstStyle/>
+          <a:p>
+            <a:pPr fontAlgn="base"/>
+            <a:r>
+              <a:rPr lang="en-US" sz="3200" dirty="0">
+                <a:solidFill>
+                  <a:schemeClr val="dk1"/>
+                </a:solidFill>
+                <a:latin typeface="Arial" panose="020B0604020202020204" pitchFamily="34" charset="0"/>
+                <a:ea typeface="Helvetica Neue"/>
+                <a:cs typeface="Arial" panose="020B0604020202020204" pitchFamily="34" charset="0"/>
+                <a:sym typeface="Helvetica Neue"/>
+              </a:rPr>
+              <a:t>AIMS scores did not mediate this relationship for overall exposure to threat (indirect effect: B = 0.02 [-0.0006, 0.05]) or childhood CHAOS scores (indirect effect: B = 0.02 [-0.001, 0.05]), but it did for adolescent CHAOS scores (indirect effect: B = 0.02 [0.001, 0.05]).</a:t>
+            </a:r>
+          </a:p>
+          <a:p>
+            <a:pPr fontAlgn="base"/>
+            <a:endParaRPr lang="en-US" sz="3200" dirty="0">
+              <a:solidFill>
+                <a:schemeClr val="dk1"/>
+              </a:solidFill>
+              <a:latin typeface="Arial" panose="020B0604020202020204" pitchFamily="34" charset="0"/>
+              <a:ea typeface="Helvetica Neue"/>
+              <a:cs typeface="Arial" panose="020B0604020202020204" pitchFamily="34" charset="0"/>
+              <a:sym typeface="Helvetica Neue"/>
+            </a:endParaRPr>
+          </a:p>
+          <a:p>
+            <a:pPr fontAlgn="base"/>
+            <a:endParaRPr lang="en-US" sz="3200" dirty="0">
+              <a:solidFill>
+                <a:schemeClr val="dk1"/>
+              </a:solidFill>
+              <a:latin typeface="Arial" panose="020B0604020202020204" pitchFamily="34" charset="0"/>
+              <a:ea typeface="Helvetica Neue"/>
+              <a:cs typeface="Arial" panose="020B0604020202020204" pitchFamily="34" charset="0"/>
+              <a:sym typeface="Helvetica Neue"/>
+            </a:endParaRPr>
+          </a:p>
+          <a:p>
+            <a:pPr fontAlgn="base"/>
+            <a:endParaRPr lang="en-US" sz="3200" dirty="0">
+              <a:solidFill>
+                <a:schemeClr val="dk1"/>
+              </a:solidFill>
+              <a:latin typeface="Arial" panose="020B0604020202020204" pitchFamily="34" charset="0"/>
+              <a:ea typeface="Helvetica Neue"/>
+              <a:cs typeface="Arial" panose="020B0604020202020204" pitchFamily="34" charset="0"/>
+              <a:sym typeface="Helvetica Neue"/>
+            </a:endParaRPr>
+          </a:p>
+          <a:p>
+            <a:pPr marL="457200" indent="-457200" fontAlgn="base">
+              <a:buFont typeface="Arial" panose="020B0604020202020204" pitchFamily="34" charset="0"/>
+              <a:buChar char="•"/>
+            </a:pPr>
+            <a:r>
+              <a:rPr lang="en-US" sz="3200" dirty="0">
+                <a:solidFill>
+                  <a:schemeClr val="dk1"/>
+                </a:solidFill>
+                <a:latin typeface="Arial" panose="020B0604020202020204" pitchFamily="34" charset="0"/>
+                <a:ea typeface="Helvetica Neue"/>
+                <a:cs typeface="Arial" panose="020B0604020202020204" pitchFamily="34" charset="0"/>
+                <a:sym typeface="Helvetica Neue"/>
+              </a:rPr>
+              <a:t>“Escaping” adverse contexts is one way individuals with ELA develop resilience</a:t>
+            </a:r>
+          </a:p>
+          <a:p>
+            <a:pPr marL="457200" indent="-457200" fontAlgn="base">
+              <a:buFont typeface="Arial" panose="020B0604020202020204" pitchFamily="34" charset="0"/>
+              <a:buChar char="•"/>
+            </a:pPr>
+            <a:r>
+              <a:rPr lang="en-US" sz="3200" dirty="0">
+                <a:solidFill>
+                  <a:schemeClr val="dk1"/>
+                </a:solidFill>
+                <a:latin typeface="Arial" panose="020B0604020202020204" pitchFamily="34" charset="0"/>
+                <a:ea typeface="Helvetica Neue"/>
+                <a:cs typeface="Arial" panose="020B0604020202020204" pitchFamily="34" charset="0"/>
+                <a:sym typeface="Helvetica Neue"/>
+              </a:rPr>
+              <a:t>AIMS did not mediate the relationship between exposure to threat and resilience because it is likely not advantageous to psychologically escape these contexts</a:t>
+            </a:r>
+          </a:p>
+          <a:p>
+            <a:pPr marL="457200" indent="-457200" fontAlgn="base">
+              <a:buFont typeface="Arial" panose="020B0604020202020204" pitchFamily="34" charset="0"/>
+              <a:buChar char="•"/>
+            </a:pPr>
+            <a:r>
+              <a:rPr lang="en-US" sz="3200" dirty="0">
+                <a:solidFill>
+                  <a:schemeClr val="dk1"/>
+                </a:solidFill>
+                <a:latin typeface="Arial" panose="020B0604020202020204" pitchFamily="34" charset="0"/>
+                <a:ea typeface="Helvetica Neue"/>
+                <a:cs typeface="Arial" panose="020B0604020202020204" pitchFamily="34" charset="0"/>
+                <a:sym typeface="Helvetica Neue"/>
+              </a:rPr>
+              <a:t>CHAOS – AIMS – Resilience mediation driven by adolescent CHAOS scores, likely due to increased agency in music listening during this time (citation)</a:t>
+            </a:r>
+          </a:p>
+          <a:p>
+            <a:pPr marL="457200" indent="-457200" fontAlgn="base">
+              <a:buFont typeface="Arial" panose="020B0604020202020204" pitchFamily="34" charset="0"/>
+              <a:buChar char="•"/>
+            </a:pPr>
+            <a:r>
+              <a:rPr lang="en-US" sz="3200" dirty="0">
+                <a:solidFill>
+                  <a:schemeClr val="dk1"/>
+                </a:solidFill>
+                <a:latin typeface="Arial" panose="020B0604020202020204" pitchFamily="34" charset="0"/>
+                <a:ea typeface="Helvetica Neue"/>
+                <a:cs typeface="Arial" panose="020B0604020202020204" pitchFamily="34" charset="0"/>
+                <a:sym typeface="Helvetica Neue"/>
+              </a:rPr>
+              <a:t>[Anything else?]</a:t>
+            </a:r>
+          </a:p>
+          <a:p>
+            <a:pPr marL="457200" indent="-457200" fontAlgn="base">
+              <a:buFont typeface="Arial" panose="020B0604020202020204" pitchFamily="34" charset="0"/>
+              <a:buChar char="•"/>
+            </a:pPr>
+            <a:endParaRPr lang="en-US" sz="3200" dirty="0">
+              <a:solidFill>
+                <a:schemeClr val="dk1"/>
+              </a:solidFill>
+              <a:latin typeface="Arial" panose="020B0604020202020204" pitchFamily="34" charset="0"/>
+              <a:ea typeface="Helvetica Neue"/>
+              <a:cs typeface="Arial" panose="020B0604020202020204" pitchFamily="34" charset="0"/>
+              <a:sym typeface="Helvetica Neue"/>
+            </a:endParaRPr>
+          </a:p>
+        </p:txBody>
+      </p:sp>
+      <p:pic>
+        <p:nvPicPr>
+          <p:cNvPr id="30" name="Picture 29">
+            <a:extLst>
+              <a:ext uri="{FF2B5EF4-FFF2-40B4-BE49-F238E27FC236}">
+                <a16:creationId xmlns:a16="http://schemas.microsoft.com/office/drawing/2014/main" id="{AC857DA8-57FC-4130-8807-CCCA9EA6FC84}"/>
+              </a:ext>
+            </a:extLst>
+          </p:cNvPr>
+          <p:cNvPicPr>
+            <a:picLocks noChangeAspect="1"/>
+          </p:cNvPicPr>
+          <p:nvPr/>
+        </p:nvPicPr>
+        <p:blipFill rotWithShape="1">
+          <a:blip r:embed="rId16"/>
+          <a:srcRect t="8867" b="60001"/>
+          <a:stretch/>
+        </p:blipFill>
+        <p:spPr>
+          <a:xfrm>
+            <a:off x="30913522" y="18112422"/>
+            <a:ext cx="9545175" cy="7428934"/>
           </a:xfrm>
           <a:prstGeom prst="rect">
             <a:avLst/>

</xml_diff>

<commit_message>
adding M@H template poster
</commit_message>
<xml_diff>
--- a/presentations/ISDP_absorptionposter.pptx
+++ b/presentations/ISDP_absorptionposter.pptx
@@ -262,7 +262,7 @@
       <p15:sldGuideLst xmlns:p15="http://schemas.microsoft.com/office/powerpoint/2012/main"/>
     </p:ext>
     <p:ext uri="http://customooxmlschemas.google.com/">
-      <go:slidesCustomData xmlns="" xmlns:mc="http://schemas.openxmlformats.org/markup-compatibility/2006" xmlns:mv="urn:schemas-microsoft-com:mac:vml" xmlns:c="http://schemas.openxmlformats.org/drawingml/2006/chart" xmlns:dgm="http://schemas.openxmlformats.org/drawingml/2006/diagram" xmlns:o="urn:schemas-microsoft-com:office:office" xmlns:v="urn:schemas-microsoft-com:vml" xmlns:pvml="urn:schemas-microsoft-com:office:powerpoint" xmlns:com="http://schemas.openxmlformats.org/drawingml/2006/compatibility" xmlns:p14="http://schemas.microsoft.com/office/powerpoint/2010/main" xmlns:p15="http://schemas.microsoft.com/office/powerpoint/2012/main" xmlns:ahyp="http://schemas.microsoft.com/office/drawing/2018/hyperlinkcolor" xmlns:go="http://customooxmlschemas.google.com/" r:id="rId12" roundtripDataSignature="AMtx7mgUZ/EanI988gELEzf8evnhnh3MyA=="/>
+      <go:slidesCustomData xmlns:go="http://customooxmlschemas.google.com/" xmlns:ahyp="http://schemas.microsoft.com/office/drawing/2018/hyperlinkcolor" xmlns:p15="http://schemas.microsoft.com/office/powerpoint/2012/main" xmlns:p14="http://schemas.microsoft.com/office/powerpoint/2010/main" xmlns:com="http://schemas.openxmlformats.org/drawingml/2006/compatibility" xmlns:pvml="urn:schemas-microsoft-com:office:powerpoint" xmlns:v="urn:schemas-microsoft-com:vml" xmlns:o="urn:schemas-microsoft-com:office:office" xmlns:dgm="http://schemas.openxmlformats.org/drawingml/2006/diagram" xmlns:c="http://schemas.openxmlformats.org/drawingml/2006/chart" xmlns:mv="urn:schemas-microsoft-com:mac:vml" xmlns:mc="http://schemas.openxmlformats.org/markup-compatibility/2006" xmlns="" r:id="rId12" roundtripDataSignature="AMtx7mgUZ/EanI988gELEzf8evnhnh3MyA=="/>
     </p:ext>
   </p:extLst>
 </p:presentation>
@@ -10295,7 +10295,7 @@
         </p:nvSpPr>
         <p:spPr>
           <a:xfrm>
-            <a:off x="29200935" y="34263905"/>
+            <a:off x="29104632" y="33625600"/>
             <a:ext cx="13877365" cy="1081470"/>
           </a:xfrm>
           <a:prstGeom prst="rect">

</xml_diff>